<commit_message>
[TestStrategy] PPT for test strategy presentation
</commit_message>
<xml_diff>
--- a/TestStrategy.pptx
+++ b/TestStrategy.pptx
@@ -17,10 +17,10 @@
     <p:sldId id="266" r:id="rId11"/>
     <p:sldId id="267" r:id="rId12"/>
     <p:sldId id="274" r:id="rId13"/>
-    <p:sldId id="268" r:id="rId14"/>
-    <p:sldId id="270" r:id="rId15"/>
-    <p:sldId id="273" r:id="rId16"/>
-    <p:sldId id="275" r:id="rId17"/>
+    <p:sldId id="273" r:id="rId14"/>
+    <p:sldId id="275" r:id="rId15"/>
+    <p:sldId id="268" r:id="rId16"/>
+    <p:sldId id="270" r:id="rId17"/>
     <p:sldId id="271" r:id="rId18"/>
     <p:sldId id="272" r:id="rId19"/>
     <p:sldId id="276" r:id="rId20"/>
@@ -9752,7 +9752,7 @@
           <p:nvPr>
             <p:extLst>
               <p:ext uri="{D42A27DB-BD31-4B8C-83A1-F6EECF244321}">
-                <p14:modId xmlns:p14="http://schemas.microsoft.com/office/powerpoint/2010/main" val="1975064201"/>
+                <p14:modId xmlns:p14="http://schemas.microsoft.com/office/powerpoint/2010/main" val="2581333208"/>
               </p:ext>
             </p:extLst>
           </p:nvPr>
@@ -9948,7 +9948,7 @@
                     <a:p>
                       <a:r>
                         <a:rPr lang="es-CO" sz="2400" dirty="0"/>
-                        <a:t>Manuales o automáticas</a:t>
+                        <a:t>Manuales o automatizadas</a:t>
                       </a:r>
                       <a:endParaRPr lang="en-US" sz="2400" dirty="0"/>
                     </a:p>
@@ -9979,7 +9979,7 @@
                       </a:pPr>
                       <a:r>
                         <a:rPr lang="es-CO" sz="2400" dirty="0"/>
-                        <a:t>Manuales o automáticas</a:t>
+                        <a:t>Manuales o automatizadas</a:t>
                       </a:r>
                       <a:endParaRPr lang="en-US" sz="2400" dirty="0"/>
                     </a:p>
@@ -10047,25 +10047,240 @@
         </p:nvSpPr>
         <p:spPr>
           <a:xfrm>
-            <a:off x="570897" y="107549"/>
-            <a:ext cx="10515600" cy="1325563"/>
+            <a:off x="142042" y="102407"/>
+            <a:ext cx="11907915" cy="1934192"/>
           </a:xfrm>
         </p:spPr>
         <p:txBody>
-          <a:bodyPr>
-            <a:normAutofit/>
+          <a:bodyPr vert="horz" lIns="91440" tIns="45720" rIns="91440" bIns="45720" rtlCol="0" anchor="ctr">
+            <a:normAutofit fontScale="90000"/>
           </a:bodyPr>
           <a:lstStyle/>
           <a:p>
             <a:r>
-              <a:rPr lang="es-CO" dirty="0">
+              <a:rPr lang="es-ES" sz="5000" dirty="0"/>
+              <a:t>¿CÓMO DEBE SER LA DISTRIBUCIÓN DE ESFUERZO PARA LOS NIVELES DE PRUEBAS?</a:t>
+            </a:r>
+          </a:p>
+        </p:txBody>
+      </p:sp>
+      <p:pic>
+        <p:nvPicPr>
+          <p:cNvPr id="5" name="Picture 4">
+            <a:extLst>
+              <a:ext uri="{FF2B5EF4-FFF2-40B4-BE49-F238E27FC236}">
+                <a16:creationId xmlns:a16="http://schemas.microsoft.com/office/drawing/2014/main" id="{3A23DD88-5A56-4C98-AE99-CB0A5E441AA9}"/>
+              </a:ext>
+            </a:extLst>
+          </p:cNvPr>
+          <p:cNvPicPr>
+            <a:picLocks noChangeAspect="1"/>
+          </p:cNvPicPr>
+          <p:nvPr/>
+        </p:nvPicPr>
+        <p:blipFill>
+          <a:blip r:embed="rId2"/>
+          <a:stretch>
+            <a:fillRect/>
+          </a:stretch>
+        </p:blipFill>
+        <p:spPr>
+          <a:xfrm>
+            <a:off x="721866" y="2134094"/>
+            <a:ext cx="3571323" cy="4447558"/>
+          </a:xfrm>
+          <a:prstGeom prst="rect">
+            <a:avLst/>
+          </a:prstGeom>
+        </p:spPr>
+      </p:pic>
+      <p:pic>
+        <p:nvPicPr>
+          <p:cNvPr id="7" name="Picture 6">
+            <a:extLst>
+              <a:ext uri="{FF2B5EF4-FFF2-40B4-BE49-F238E27FC236}">
+                <a16:creationId xmlns:a16="http://schemas.microsoft.com/office/drawing/2014/main" id="{C43FFD2C-F653-4D27-B431-5356B8DEDF31}"/>
+              </a:ext>
+            </a:extLst>
+          </p:cNvPr>
+          <p:cNvPicPr>
+            <a:picLocks noChangeAspect="1"/>
+          </p:cNvPicPr>
+          <p:nvPr/>
+        </p:nvPicPr>
+        <p:blipFill>
+          <a:blip r:embed="rId3"/>
+          <a:stretch>
+            <a:fillRect/>
+          </a:stretch>
+        </p:blipFill>
+        <p:spPr>
+          <a:xfrm>
+            <a:off x="6096000" y="2134094"/>
+            <a:ext cx="5449260" cy="4447558"/>
+          </a:xfrm>
+          <a:prstGeom prst="rect">
+            <a:avLst/>
+          </a:prstGeom>
+        </p:spPr>
+      </p:pic>
+      <p:pic>
+        <p:nvPicPr>
+          <p:cNvPr id="14342" name="Picture 6" descr="Resultado de imagen para x red without background">
+            <a:extLst>
+              <a:ext uri="{FF2B5EF4-FFF2-40B4-BE49-F238E27FC236}">
+                <a16:creationId xmlns:a16="http://schemas.microsoft.com/office/drawing/2014/main" id="{4A6DE920-CFD9-4028-A726-71C34E43F5D5}"/>
+              </a:ext>
+            </a:extLst>
+          </p:cNvPr>
+          <p:cNvPicPr>
+            <a:picLocks noChangeAspect="1" noChangeArrowheads="1"/>
+          </p:cNvPicPr>
+          <p:nvPr/>
+        </p:nvPicPr>
+        <p:blipFill>
+          <a:blip r:embed="rId4">
+            <a:extLst>
+              <a:ext uri="{28A0092B-C50C-407E-A947-70E740481C1C}">
+                <a14:useLocalDpi xmlns:a14="http://schemas.microsoft.com/office/drawing/2010/main" val="0"/>
+              </a:ext>
+            </a:extLst>
+          </a:blip>
+          <a:srcRect/>
+          <a:stretch>
+            <a:fillRect/>
+          </a:stretch>
+        </p:blipFill>
+        <p:spPr bwMode="auto">
+          <a:xfrm>
+            <a:off x="2945537" y="5459767"/>
+            <a:ext cx="1244058" cy="1244058"/>
+          </a:xfrm>
+          <a:prstGeom prst="rect">
+            <a:avLst/>
+          </a:prstGeom>
+          <a:noFill/>
+          <a:extLst>
+            <a:ext uri="{909E8E84-426E-40DD-AFC4-6F175D3DCCD1}">
+              <a14:hiddenFill xmlns:a14="http://schemas.microsoft.com/office/drawing/2010/main">
                 <a:solidFill>
-                  <a:schemeClr val="tx1"/>
+                  <a:srgbClr val="FFFFFF"/>
                 </a:solidFill>
-              </a:rPr>
-              <a:t>Estrategia de Pruebas – Niveles</a:t>
-            </a:r>
-            <a:endParaRPr lang="es-CO" dirty="0"/>
+              </a14:hiddenFill>
+            </a:ext>
+          </a:extLst>
+        </p:spPr>
+      </p:pic>
+      <p:pic>
+        <p:nvPicPr>
+          <p:cNvPr id="14344" name="Picture 8" descr="Resultado de imagen para money without background">
+            <a:extLst>
+              <a:ext uri="{FF2B5EF4-FFF2-40B4-BE49-F238E27FC236}">
+                <a16:creationId xmlns:a16="http://schemas.microsoft.com/office/drawing/2014/main" id="{48F7E377-CC08-4EC5-98A9-33421F2350CD}"/>
+              </a:ext>
+            </a:extLst>
+          </p:cNvPr>
+          <p:cNvPicPr>
+            <a:picLocks noChangeAspect="1" noChangeArrowheads="1"/>
+          </p:cNvPicPr>
+          <p:nvPr/>
+        </p:nvPicPr>
+        <p:blipFill>
+          <a:blip r:embed="rId5">
+            <a:extLst>
+              <a:ext uri="{28A0092B-C50C-407E-A947-70E740481C1C}">
+                <a14:useLocalDpi xmlns:a14="http://schemas.microsoft.com/office/drawing/2010/main" val="0"/>
+              </a:ext>
+            </a:extLst>
+          </a:blip>
+          <a:srcRect/>
+          <a:stretch>
+            <a:fillRect/>
+          </a:stretch>
+        </p:blipFill>
+        <p:spPr bwMode="auto">
+          <a:xfrm>
+            <a:off x="10192995" y="3429000"/>
+            <a:ext cx="2084007" cy="2100679"/>
+          </a:xfrm>
+          <a:prstGeom prst="rect">
+            <a:avLst/>
+          </a:prstGeom>
+          <a:noFill/>
+          <a:extLst>
+            <a:ext uri="{909E8E84-426E-40DD-AFC4-6F175D3DCCD1}">
+              <a14:hiddenFill xmlns:a14="http://schemas.microsoft.com/office/drawing/2010/main">
+                <a:solidFill>
+                  <a:srgbClr val="FFFFFF"/>
+                </a:solidFill>
+              </a14:hiddenFill>
+            </a:ext>
+          </a:extLst>
+        </p:spPr>
+      </p:pic>
+    </p:spTree>
+    <p:extLst>
+      <p:ext uri="{BB962C8B-B14F-4D97-AF65-F5344CB8AC3E}">
+        <p14:creationId xmlns:p14="http://schemas.microsoft.com/office/powerpoint/2010/main" val="500754836"/>
+      </p:ext>
+    </p:extLst>
+  </p:cSld>
+  <p:clrMapOvr>
+    <a:masterClrMapping/>
+  </p:clrMapOvr>
+</p:sld>
+</file>
+
+<file path=ppt/slides/slide14.xml><?xml version="1.0" encoding="utf-8"?>
+<p:sld xmlns:a="http://schemas.openxmlformats.org/drawingml/2006/main" xmlns:r="http://schemas.openxmlformats.org/officeDocument/2006/relationships" xmlns:p="http://schemas.openxmlformats.org/presentationml/2006/main">
+  <p:cSld>
+    <p:spTree>
+      <p:nvGrpSpPr>
+        <p:cNvPr id="1" name=""/>
+        <p:cNvGrpSpPr/>
+        <p:nvPr/>
+      </p:nvGrpSpPr>
+      <p:grpSpPr>
+        <a:xfrm>
+          <a:off x="0" y="0"/>
+          <a:ext cx="0" cy="0"/>
+          <a:chOff x="0" y="0"/>
+          <a:chExt cx="0" cy="0"/>
+        </a:xfrm>
+      </p:grpSpPr>
+      <p:sp>
+        <p:nvSpPr>
+          <p:cNvPr id="4" name="Title 3">
+            <a:extLst>
+              <a:ext uri="{FF2B5EF4-FFF2-40B4-BE49-F238E27FC236}">
+                <a16:creationId xmlns:a16="http://schemas.microsoft.com/office/drawing/2014/main" id="{BCACCA0E-7500-41AC-AEB3-5D013C1404AF}"/>
+              </a:ext>
+            </a:extLst>
+          </p:cNvPr>
+          <p:cNvSpPr>
+            <a:spLocks noGrp="1"/>
+          </p:cNvSpPr>
+          <p:nvPr>
+            <p:ph type="title"/>
+          </p:nvPr>
+        </p:nvSpPr>
+        <p:spPr>
+          <a:xfrm>
+            <a:off x="257453" y="365125"/>
+            <a:ext cx="11570562" cy="1325563"/>
+          </a:xfrm>
+        </p:spPr>
+        <p:txBody>
+          <a:bodyPr vert="horz" lIns="91440" tIns="45720" rIns="91440" bIns="45720" rtlCol="0" anchor="ctr">
+            <a:normAutofit fontScale="90000"/>
+          </a:bodyPr>
+          <a:lstStyle/>
+          <a:p>
+            <a:r>
+              <a:rPr lang="es-CO" sz="5000" b="1" dirty="0"/>
+              <a:t>Problemas en la automatización de pruebas</a:t>
+            </a:r>
+            <a:endParaRPr lang="en-US" sz="5000" b="1" dirty="0"/>
           </a:p>
         </p:txBody>
       </p:sp>
@@ -10087,6 +10302,261 @@
         </p:nvSpPr>
         <p:spPr>
           <a:xfrm>
+            <a:off x="363985" y="1843381"/>
+            <a:ext cx="11656380" cy="4351338"/>
+          </a:xfrm>
+        </p:spPr>
+        <p:txBody>
+          <a:bodyPr vert="horz" lIns="91440" tIns="45720" rIns="91440" bIns="45720" rtlCol="0">
+            <a:normAutofit fontScale="85000" lnSpcReduction="20000"/>
+          </a:bodyPr>
+          <a:lstStyle/>
+          <a:p>
+            <a:pPr marL="0" indent="0">
+              <a:buNone/>
+            </a:pPr>
+            <a:r>
+              <a:rPr lang="es-CO" b="1" dirty="0"/>
+              <a:t>Las pruebas pueden estar acopladas a la interfaz gráfica. Si cambia la UI =&gt; se debe ajustar la prueba </a:t>
+            </a:r>
+          </a:p>
+          <a:p>
+            <a:pPr marL="0" indent="0">
+              <a:buNone/>
+            </a:pPr>
+            <a:endParaRPr lang="es-ES" b="1" dirty="0"/>
+          </a:p>
+          <a:p>
+            <a:pPr marL="0" indent="0">
+              <a:buNone/>
+            </a:pPr>
+            <a:r>
+              <a:rPr lang="es-ES" b="1" dirty="0"/>
+              <a:t>FLAKY TESTS</a:t>
+            </a:r>
+          </a:p>
+          <a:p>
+            <a:pPr lvl="1"/>
+            <a:r>
+              <a:rPr lang="es-ES" b="1" dirty="0"/>
+              <a:t>Pruebas inestables</a:t>
+            </a:r>
+          </a:p>
+          <a:p>
+            <a:pPr lvl="1"/>
+            <a:r>
+              <a:rPr lang="es-ES" b="1" dirty="0"/>
+              <a:t>Fallos comunes son dependencias/servicios requeridos, conectividad eventual, </a:t>
+            </a:r>
+            <a:r>
+              <a:rPr lang="es-ES" b="1" dirty="0" err="1"/>
+              <a:t>race</a:t>
+            </a:r>
+            <a:r>
+              <a:rPr lang="es-ES" b="1" dirty="0"/>
+              <a:t> </a:t>
+            </a:r>
+            <a:r>
+              <a:rPr lang="es-ES" b="1" dirty="0" err="1"/>
+              <a:t>conditions</a:t>
+            </a:r>
+            <a:r>
+              <a:rPr lang="es-ES" b="1" dirty="0"/>
+              <a:t> en el ambiente que ejecuta la prueba</a:t>
+            </a:r>
+          </a:p>
+          <a:p>
+            <a:pPr marL="457200" lvl="1" indent="0">
+              <a:buNone/>
+            </a:pPr>
+            <a:endParaRPr lang="es-ES" b="1" dirty="0"/>
+          </a:p>
+          <a:p>
+            <a:pPr marL="0" indent="0">
+              <a:buNone/>
+            </a:pPr>
+            <a:r>
+              <a:rPr lang="es-ES" b="1" dirty="0"/>
+              <a:t>SLOW TESTS</a:t>
+            </a:r>
+          </a:p>
+          <a:p>
+            <a:pPr lvl="1"/>
+            <a:r>
+              <a:rPr lang="es-ES" b="1" dirty="0"/>
+              <a:t>Pruebas que toman mucho tiempo (se pueden presentar sobre todo en E2E </a:t>
+            </a:r>
+            <a:r>
+              <a:rPr lang="es-ES" b="1" dirty="0" err="1"/>
+              <a:t>testing</a:t>
+            </a:r>
+            <a:r>
+              <a:rPr lang="es-ES" b="1" dirty="0"/>
+              <a:t>)</a:t>
+            </a:r>
+          </a:p>
+          <a:p>
+            <a:pPr marL="457200" lvl="1" indent="0">
+              <a:buNone/>
+            </a:pPr>
+            <a:endParaRPr lang="es-ES" b="1" dirty="0"/>
+          </a:p>
+          <a:p>
+            <a:pPr marL="0" indent="0">
+              <a:buNone/>
+            </a:pPr>
+            <a:r>
+              <a:rPr lang="es-ES" b="1" dirty="0"/>
+              <a:t>GREEDY TESTS</a:t>
+            </a:r>
+          </a:p>
+          <a:p>
+            <a:pPr lvl="1"/>
+            <a:r>
+              <a:rPr lang="es-ES" b="1" dirty="0"/>
+              <a:t>Requieren una cantidad excesiva de recursos para su ejecución</a:t>
+            </a:r>
+          </a:p>
+          <a:p>
+            <a:endParaRPr lang="es-CO" b="1" dirty="0"/>
+          </a:p>
+        </p:txBody>
+      </p:sp>
+      <p:pic>
+        <p:nvPicPr>
+          <p:cNvPr id="15370" name="Picture 10" descr="Imagen relacionada">
+            <a:extLst>
+              <a:ext uri="{FF2B5EF4-FFF2-40B4-BE49-F238E27FC236}">
+                <a16:creationId xmlns:a16="http://schemas.microsoft.com/office/drawing/2014/main" id="{B88242B7-1BF3-4226-978B-1C1152DB6837}"/>
+              </a:ext>
+            </a:extLst>
+          </p:cNvPr>
+          <p:cNvPicPr>
+            <a:picLocks noChangeAspect="1" noChangeArrowheads="1"/>
+          </p:cNvPicPr>
+          <p:nvPr/>
+        </p:nvPicPr>
+        <p:blipFill>
+          <a:blip r:embed="rId2">
+            <a:extLst>
+              <a:ext uri="{28A0092B-C50C-407E-A947-70E740481C1C}">
+                <a14:useLocalDpi xmlns:a14="http://schemas.microsoft.com/office/drawing/2010/main" val="0"/>
+              </a:ext>
+            </a:extLst>
+          </a:blip>
+          <a:srcRect/>
+          <a:stretch>
+            <a:fillRect/>
+          </a:stretch>
+        </p:blipFill>
+        <p:spPr bwMode="auto">
+          <a:xfrm>
+            <a:off x="9878565" y="4746509"/>
+            <a:ext cx="1949450" cy="1898472"/>
+          </a:xfrm>
+          <a:prstGeom prst="rect">
+            <a:avLst/>
+          </a:prstGeom>
+          <a:noFill/>
+          <a:extLst>
+            <a:ext uri="{909E8E84-426E-40DD-AFC4-6F175D3DCCD1}">
+              <a14:hiddenFill xmlns:a14="http://schemas.microsoft.com/office/drawing/2010/main">
+                <a:solidFill>
+                  <a:srgbClr val="FFFFFF"/>
+                </a:solidFill>
+              </a14:hiddenFill>
+            </a:ext>
+          </a:extLst>
+        </p:spPr>
+      </p:pic>
+    </p:spTree>
+    <p:extLst>
+      <p:ext uri="{BB962C8B-B14F-4D97-AF65-F5344CB8AC3E}">
+        <p14:creationId xmlns:p14="http://schemas.microsoft.com/office/powerpoint/2010/main" val="2511828912"/>
+      </p:ext>
+    </p:extLst>
+  </p:cSld>
+  <p:clrMapOvr>
+    <a:masterClrMapping/>
+  </p:clrMapOvr>
+</p:sld>
+</file>
+
+<file path=ppt/slides/slide15.xml><?xml version="1.0" encoding="utf-8"?>
+<p:sld xmlns:a="http://schemas.openxmlformats.org/drawingml/2006/main" xmlns:r="http://schemas.openxmlformats.org/officeDocument/2006/relationships" xmlns:p="http://schemas.openxmlformats.org/presentationml/2006/main">
+  <p:cSld>
+    <p:spTree>
+      <p:nvGrpSpPr>
+        <p:cNvPr id="1" name=""/>
+        <p:cNvGrpSpPr/>
+        <p:nvPr/>
+      </p:nvGrpSpPr>
+      <p:grpSpPr>
+        <a:xfrm>
+          <a:off x="0" y="0"/>
+          <a:ext cx="0" cy="0"/>
+          <a:chOff x="0" y="0"/>
+          <a:chExt cx="0" cy="0"/>
+        </a:xfrm>
+      </p:grpSpPr>
+      <p:sp>
+        <p:nvSpPr>
+          <p:cNvPr id="4" name="Title 3">
+            <a:extLst>
+              <a:ext uri="{FF2B5EF4-FFF2-40B4-BE49-F238E27FC236}">
+                <a16:creationId xmlns:a16="http://schemas.microsoft.com/office/drawing/2014/main" id="{BCACCA0E-7500-41AC-AEB3-5D013C1404AF}"/>
+              </a:ext>
+            </a:extLst>
+          </p:cNvPr>
+          <p:cNvSpPr>
+            <a:spLocks noGrp="1"/>
+          </p:cNvSpPr>
+          <p:nvPr>
+            <p:ph type="title"/>
+          </p:nvPr>
+        </p:nvSpPr>
+        <p:spPr>
+          <a:xfrm>
+            <a:off x="570897" y="107549"/>
+            <a:ext cx="10515600" cy="1325563"/>
+          </a:xfrm>
+        </p:spPr>
+        <p:txBody>
+          <a:bodyPr>
+            <a:normAutofit/>
+          </a:bodyPr>
+          <a:lstStyle/>
+          <a:p>
+            <a:r>
+              <a:rPr lang="es-CO" dirty="0">
+                <a:solidFill>
+                  <a:schemeClr val="tx1"/>
+                </a:solidFill>
+              </a:rPr>
+              <a:t>Estrategia de Pruebas – Niveles</a:t>
+            </a:r>
+            <a:endParaRPr lang="es-CO" dirty="0"/>
+          </a:p>
+        </p:txBody>
+      </p:sp>
+      <p:sp>
+        <p:nvSpPr>
+          <p:cNvPr id="6" name="Content Placeholder 5">
+            <a:extLst>
+              <a:ext uri="{FF2B5EF4-FFF2-40B4-BE49-F238E27FC236}">
+                <a16:creationId xmlns:a16="http://schemas.microsoft.com/office/drawing/2014/main" id="{F00E2929-535B-40BF-8AA6-13C4B74D0EE7}"/>
+              </a:ext>
+            </a:extLst>
+          </p:cNvPr>
+          <p:cNvSpPr>
+            <a:spLocks noGrp="1"/>
+          </p:cNvSpPr>
+          <p:nvPr>
+            <p:ph sz="half" idx="1"/>
+          </p:nvPr>
+        </p:nvSpPr>
+        <p:spPr>
+          <a:xfrm>
             <a:off x="279142" y="1734036"/>
             <a:ext cx="11779507" cy="4819164"/>
           </a:xfrm>
@@ -10177,7 +10647,7 @@
 </p:sld>
 </file>
 
-<file path=ppt/slides/slide14.xml><?xml version="1.0" encoding="utf-8"?>
+<file path=ppt/slides/slide16.xml><?xml version="1.0" encoding="utf-8"?>
 <p:sld xmlns:a="http://schemas.openxmlformats.org/drawingml/2006/main" xmlns:r="http://schemas.openxmlformats.org/officeDocument/2006/relationships" xmlns:p="http://schemas.openxmlformats.org/presentationml/2006/main">
   <p:cSld>
     <p:spTree>
@@ -10872,476 +11342,6 @@
     <p:extLst>
       <p:ext uri="{BB962C8B-B14F-4D97-AF65-F5344CB8AC3E}">
         <p14:creationId xmlns:p14="http://schemas.microsoft.com/office/powerpoint/2010/main" val="467910796"/>
-      </p:ext>
-    </p:extLst>
-  </p:cSld>
-  <p:clrMapOvr>
-    <a:masterClrMapping/>
-  </p:clrMapOvr>
-</p:sld>
-</file>
-
-<file path=ppt/slides/slide15.xml><?xml version="1.0" encoding="utf-8"?>
-<p:sld xmlns:a="http://schemas.openxmlformats.org/drawingml/2006/main" xmlns:r="http://schemas.openxmlformats.org/officeDocument/2006/relationships" xmlns:p="http://schemas.openxmlformats.org/presentationml/2006/main">
-  <p:cSld>
-    <p:spTree>
-      <p:nvGrpSpPr>
-        <p:cNvPr id="1" name=""/>
-        <p:cNvGrpSpPr/>
-        <p:nvPr/>
-      </p:nvGrpSpPr>
-      <p:grpSpPr>
-        <a:xfrm>
-          <a:off x="0" y="0"/>
-          <a:ext cx="0" cy="0"/>
-          <a:chOff x="0" y="0"/>
-          <a:chExt cx="0" cy="0"/>
-        </a:xfrm>
-      </p:grpSpPr>
-      <p:sp>
-        <p:nvSpPr>
-          <p:cNvPr id="4" name="Title 3">
-            <a:extLst>
-              <a:ext uri="{FF2B5EF4-FFF2-40B4-BE49-F238E27FC236}">
-                <a16:creationId xmlns:a16="http://schemas.microsoft.com/office/drawing/2014/main" id="{BCACCA0E-7500-41AC-AEB3-5D013C1404AF}"/>
-              </a:ext>
-            </a:extLst>
-          </p:cNvPr>
-          <p:cNvSpPr>
-            <a:spLocks noGrp="1"/>
-          </p:cNvSpPr>
-          <p:nvPr>
-            <p:ph type="title"/>
-          </p:nvPr>
-        </p:nvSpPr>
-        <p:spPr>
-          <a:xfrm>
-            <a:off x="142042" y="276348"/>
-            <a:ext cx="11907915" cy="1934192"/>
-          </a:xfrm>
-        </p:spPr>
-        <p:txBody>
-          <a:bodyPr vert="horz" lIns="91440" tIns="45720" rIns="91440" bIns="45720" rtlCol="0" anchor="ctr">
-            <a:normAutofit fontScale="90000"/>
-          </a:bodyPr>
-          <a:lstStyle/>
-          <a:p>
-            <a:r>
-              <a:rPr lang="es-ES" sz="5000" dirty="0"/>
-              <a:t>¿CÓMO DEBE SER LA DISTRIBUCIÓN DE ESFUERZO PARA LOS NIVELES DE PRUEBAS?</a:t>
-            </a:r>
-          </a:p>
-        </p:txBody>
-      </p:sp>
-      <p:pic>
-        <p:nvPicPr>
-          <p:cNvPr id="5" name="Picture 4">
-            <a:extLst>
-              <a:ext uri="{FF2B5EF4-FFF2-40B4-BE49-F238E27FC236}">
-                <a16:creationId xmlns:a16="http://schemas.microsoft.com/office/drawing/2014/main" id="{3A23DD88-5A56-4C98-AE99-CB0A5E441AA9}"/>
-              </a:ext>
-            </a:extLst>
-          </p:cNvPr>
-          <p:cNvPicPr>
-            <a:picLocks noChangeAspect="1"/>
-          </p:cNvPicPr>
-          <p:nvPr/>
-        </p:nvPicPr>
-        <p:blipFill>
-          <a:blip r:embed="rId2"/>
-          <a:stretch>
-            <a:fillRect/>
-          </a:stretch>
-        </p:blipFill>
-        <p:spPr>
-          <a:xfrm>
-            <a:off x="721866" y="2134094"/>
-            <a:ext cx="3571323" cy="4447558"/>
-          </a:xfrm>
-          <a:prstGeom prst="rect">
-            <a:avLst/>
-          </a:prstGeom>
-        </p:spPr>
-      </p:pic>
-      <p:pic>
-        <p:nvPicPr>
-          <p:cNvPr id="7" name="Picture 6">
-            <a:extLst>
-              <a:ext uri="{FF2B5EF4-FFF2-40B4-BE49-F238E27FC236}">
-                <a16:creationId xmlns:a16="http://schemas.microsoft.com/office/drawing/2014/main" id="{C43FFD2C-F653-4D27-B431-5356B8DEDF31}"/>
-              </a:ext>
-            </a:extLst>
-          </p:cNvPr>
-          <p:cNvPicPr>
-            <a:picLocks noChangeAspect="1"/>
-          </p:cNvPicPr>
-          <p:nvPr/>
-        </p:nvPicPr>
-        <p:blipFill>
-          <a:blip r:embed="rId3"/>
-          <a:stretch>
-            <a:fillRect/>
-          </a:stretch>
-        </p:blipFill>
-        <p:spPr>
-          <a:xfrm>
-            <a:off x="6096000" y="2134094"/>
-            <a:ext cx="5449260" cy="4447558"/>
-          </a:xfrm>
-          <a:prstGeom prst="rect">
-            <a:avLst/>
-          </a:prstGeom>
-        </p:spPr>
-      </p:pic>
-      <p:pic>
-        <p:nvPicPr>
-          <p:cNvPr id="14342" name="Picture 6" descr="Resultado de imagen para x red without background">
-            <a:extLst>
-              <a:ext uri="{FF2B5EF4-FFF2-40B4-BE49-F238E27FC236}">
-                <a16:creationId xmlns:a16="http://schemas.microsoft.com/office/drawing/2014/main" id="{4A6DE920-CFD9-4028-A726-71C34E43F5D5}"/>
-              </a:ext>
-            </a:extLst>
-          </p:cNvPr>
-          <p:cNvPicPr>
-            <a:picLocks noChangeAspect="1" noChangeArrowheads="1"/>
-          </p:cNvPicPr>
-          <p:nvPr/>
-        </p:nvPicPr>
-        <p:blipFill>
-          <a:blip r:embed="rId4">
-            <a:extLst>
-              <a:ext uri="{28A0092B-C50C-407E-A947-70E740481C1C}">
-                <a14:useLocalDpi xmlns:a14="http://schemas.microsoft.com/office/drawing/2010/main" val="0"/>
-              </a:ext>
-            </a:extLst>
-          </a:blip>
-          <a:srcRect/>
-          <a:stretch>
-            <a:fillRect/>
-          </a:stretch>
-        </p:blipFill>
-        <p:spPr bwMode="auto">
-          <a:xfrm>
-            <a:off x="2945537" y="5459767"/>
-            <a:ext cx="1244058" cy="1244058"/>
-          </a:xfrm>
-          <a:prstGeom prst="rect">
-            <a:avLst/>
-          </a:prstGeom>
-          <a:noFill/>
-          <a:extLst>
-            <a:ext uri="{909E8E84-426E-40DD-AFC4-6F175D3DCCD1}">
-              <a14:hiddenFill xmlns:a14="http://schemas.microsoft.com/office/drawing/2010/main">
-                <a:solidFill>
-                  <a:srgbClr val="FFFFFF"/>
-                </a:solidFill>
-              </a14:hiddenFill>
-            </a:ext>
-          </a:extLst>
-        </p:spPr>
-      </p:pic>
-      <p:pic>
-        <p:nvPicPr>
-          <p:cNvPr id="14344" name="Picture 8" descr="Resultado de imagen para money without background">
-            <a:extLst>
-              <a:ext uri="{FF2B5EF4-FFF2-40B4-BE49-F238E27FC236}">
-                <a16:creationId xmlns:a16="http://schemas.microsoft.com/office/drawing/2014/main" id="{48F7E377-CC08-4EC5-98A9-33421F2350CD}"/>
-              </a:ext>
-            </a:extLst>
-          </p:cNvPr>
-          <p:cNvPicPr>
-            <a:picLocks noChangeAspect="1" noChangeArrowheads="1"/>
-          </p:cNvPicPr>
-          <p:nvPr/>
-        </p:nvPicPr>
-        <p:blipFill>
-          <a:blip r:embed="rId5">
-            <a:extLst>
-              <a:ext uri="{28A0092B-C50C-407E-A947-70E740481C1C}">
-                <a14:useLocalDpi xmlns:a14="http://schemas.microsoft.com/office/drawing/2010/main" val="0"/>
-              </a:ext>
-            </a:extLst>
-          </a:blip>
-          <a:srcRect/>
-          <a:stretch>
-            <a:fillRect/>
-          </a:stretch>
-        </p:blipFill>
-        <p:spPr bwMode="auto">
-          <a:xfrm>
-            <a:off x="10192995" y="3429000"/>
-            <a:ext cx="2084007" cy="2100679"/>
-          </a:xfrm>
-          <a:prstGeom prst="rect">
-            <a:avLst/>
-          </a:prstGeom>
-          <a:noFill/>
-          <a:extLst>
-            <a:ext uri="{909E8E84-426E-40DD-AFC4-6F175D3DCCD1}">
-              <a14:hiddenFill xmlns:a14="http://schemas.microsoft.com/office/drawing/2010/main">
-                <a:solidFill>
-                  <a:srgbClr val="FFFFFF"/>
-                </a:solidFill>
-              </a14:hiddenFill>
-            </a:ext>
-          </a:extLst>
-        </p:spPr>
-      </p:pic>
-    </p:spTree>
-    <p:extLst>
-      <p:ext uri="{BB962C8B-B14F-4D97-AF65-F5344CB8AC3E}">
-        <p14:creationId xmlns:p14="http://schemas.microsoft.com/office/powerpoint/2010/main" val="500754836"/>
-      </p:ext>
-    </p:extLst>
-  </p:cSld>
-  <p:clrMapOvr>
-    <a:masterClrMapping/>
-  </p:clrMapOvr>
-</p:sld>
-</file>
-
-<file path=ppt/slides/slide16.xml><?xml version="1.0" encoding="utf-8"?>
-<p:sld xmlns:a="http://schemas.openxmlformats.org/drawingml/2006/main" xmlns:r="http://schemas.openxmlformats.org/officeDocument/2006/relationships" xmlns:p="http://schemas.openxmlformats.org/presentationml/2006/main">
-  <p:cSld>
-    <p:spTree>
-      <p:nvGrpSpPr>
-        <p:cNvPr id="1" name=""/>
-        <p:cNvGrpSpPr/>
-        <p:nvPr/>
-      </p:nvGrpSpPr>
-      <p:grpSpPr>
-        <a:xfrm>
-          <a:off x="0" y="0"/>
-          <a:ext cx="0" cy="0"/>
-          <a:chOff x="0" y="0"/>
-          <a:chExt cx="0" cy="0"/>
-        </a:xfrm>
-      </p:grpSpPr>
-      <p:sp>
-        <p:nvSpPr>
-          <p:cNvPr id="4" name="Title 3">
-            <a:extLst>
-              <a:ext uri="{FF2B5EF4-FFF2-40B4-BE49-F238E27FC236}">
-                <a16:creationId xmlns:a16="http://schemas.microsoft.com/office/drawing/2014/main" id="{BCACCA0E-7500-41AC-AEB3-5D013C1404AF}"/>
-              </a:ext>
-            </a:extLst>
-          </p:cNvPr>
-          <p:cNvSpPr>
-            <a:spLocks noGrp="1"/>
-          </p:cNvSpPr>
-          <p:nvPr>
-            <p:ph type="title"/>
-          </p:nvPr>
-        </p:nvSpPr>
-        <p:spPr>
-          <a:xfrm>
-            <a:off x="257453" y="365125"/>
-            <a:ext cx="11570562" cy="1325563"/>
-          </a:xfrm>
-        </p:spPr>
-        <p:txBody>
-          <a:bodyPr vert="horz" lIns="91440" tIns="45720" rIns="91440" bIns="45720" rtlCol="0" anchor="ctr">
-            <a:normAutofit fontScale="90000"/>
-          </a:bodyPr>
-          <a:lstStyle/>
-          <a:p>
-            <a:r>
-              <a:rPr lang="es-CO" sz="5000" b="1" dirty="0"/>
-              <a:t>Problemas en la automatización de pruebas</a:t>
-            </a:r>
-            <a:endParaRPr lang="en-US" sz="5000" b="1" dirty="0"/>
-          </a:p>
-        </p:txBody>
-      </p:sp>
-      <p:sp>
-        <p:nvSpPr>
-          <p:cNvPr id="6" name="Content Placeholder 5">
-            <a:extLst>
-              <a:ext uri="{FF2B5EF4-FFF2-40B4-BE49-F238E27FC236}">
-                <a16:creationId xmlns:a16="http://schemas.microsoft.com/office/drawing/2014/main" id="{F00E2929-535B-40BF-8AA6-13C4B74D0EE7}"/>
-              </a:ext>
-            </a:extLst>
-          </p:cNvPr>
-          <p:cNvSpPr>
-            <a:spLocks noGrp="1"/>
-          </p:cNvSpPr>
-          <p:nvPr>
-            <p:ph sz="half" idx="1"/>
-          </p:nvPr>
-        </p:nvSpPr>
-        <p:spPr>
-          <a:xfrm>
-            <a:off x="363985" y="1843381"/>
-            <a:ext cx="11656380" cy="4351338"/>
-          </a:xfrm>
-        </p:spPr>
-        <p:txBody>
-          <a:bodyPr vert="horz" lIns="91440" tIns="45720" rIns="91440" bIns="45720" rtlCol="0">
-            <a:normAutofit fontScale="85000" lnSpcReduction="20000"/>
-          </a:bodyPr>
-          <a:lstStyle/>
-          <a:p>
-            <a:pPr marL="0" indent="0">
-              <a:buNone/>
-            </a:pPr>
-            <a:r>
-              <a:rPr lang="es-CO" b="1" dirty="0"/>
-              <a:t>Las pruebas pueden estar acopladas a la interfaz gráfica. Si cambia la UI =&gt; se debe ajustar la prueba </a:t>
-            </a:r>
-          </a:p>
-          <a:p>
-            <a:pPr marL="0" indent="0">
-              <a:buNone/>
-            </a:pPr>
-            <a:endParaRPr lang="es-ES" b="1" dirty="0"/>
-          </a:p>
-          <a:p>
-            <a:pPr marL="0" indent="0">
-              <a:buNone/>
-            </a:pPr>
-            <a:r>
-              <a:rPr lang="es-ES" b="1" dirty="0"/>
-              <a:t>FLAKY TESTS</a:t>
-            </a:r>
-          </a:p>
-          <a:p>
-            <a:pPr lvl="1"/>
-            <a:r>
-              <a:rPr lang="es-ES" b="1" dirty="0"/>
-              <a:t>Pruebas inestables</a:t>
-            </a:r>
-          </a:p>
-          <a:p>
-            <a:pPr lvl="1"/>
-            <a:r>
-              <a:rPr lang="es-ES" b="1" dirty="0"/>
-              <a:t>Fallos comunes son dependencias/servicios requeridos, conectividad eventual, </a:t>
-            </a:r>
-            <a:r>
-              <a:rPr lang="es-ES" b="1" dirty="0" err="1"/>
-              <a:t>race</a:t>
-            </a:r>
-            <a:r>
-              <a:rPr lang="es-ES" b="1" dirty="0"/>
-              <a:t> </a:t>
-            </a:r>
-            <a:r>
-              <a:rPr lang="es-ES" b="1" dirty="0" err="1"/>
-              <a:t>conditions</a:t>
-            </a:r>
-            <a:r>
-              <a:rPr lang="es-ES" b="1" dirty="0"/>
-              <a:t> en el ambiente que ejecuta la prueba</a:t>
-            </a:r>
-          </a:p>
-          <a:p>
-            <a:pPr marL="457200" lvl="1" indent="0">
-              <a:buNone/>
-            </a:pPr>
-            <a:endParaRPr lang="es-ES" b="1" dirty="0"/>
-          </a:p>
-          <a:p>
-            <a:pPr marL="0" indent="0">
-              <a:buNone/>
-            </a:pPr>
-            <a:r>
-              <a:rPr lang="es-ES" b="1" dirty="0"/>
-              <a:t>SLOW TESTS</a:t>
-            </a:r>
-          </a:p>
-          <a:p>
-            <a:pPr lvl="1"/>
-            <a:r>
-              <a:rPr lang="es-ES" b="1" dirty="0"/>
-              <a:t>Pruebas que toman mucho tiempo (se pueden presentar sobre todo en E2E </a:t>
-            </a:r>
-            <a:r>
-              <a:rPr lang="es-ES" b="1" dirty="0" err="1"/>
-              <a:t>testing</a:t>
-            </a:r>
-            <a:r>
-              <a:rPr lang="es-ES" b="1" dirty="0"/>
-              <a:t>)</a:t>
-            </a:r>
-          </a:p>
-          <a:p>
-            <a:pPr marL="457200" lvl="1" indent="0">
-              <a:buNone/>
-            </a:pPr>
-            <a:endParaRPr lang="es-ES" b="1" dirty="0"/>
-          </a:p>
-          <a:p>
-            <a:pPr marL="0" indent="0">
-              <a:buNone/>
-            </a:pPr>
-            <a:r>
-              <a:rPr lang="es-ES" b="1" dirty="0"/>
-              <a:t>GREEDY TESTS</a:t>
-            </a:r>
-          </a:p>
-          <a:p>
-            <a:pPr lvl="1"/>
-            <a:r>
-              <a:rPr lang="es-ES" b="1" dirty="0"/>
-              <a:t>Requieren una cantidad excesiva de recursos para su ejecución</a:t>
-            </a:r>
-          </a:p>
-          <a:p>
-            <a:endParaRPr lang="es-CO" b="1" dirty="0"/>
-          </a:p>
-        </p:txBody>
-      </p:sp>
-      <p:pic>
-        <p:nvPicPr>
-          <p:cNvPr id="15370" name="Picture 10" descr="Imagen relacionada">
-            <a:extLst>
-              <a:ext uri="{FF2B5EF4-FFF2-40B4-BE49-F238E27FC236}">
-                <a16:creationId xmlns:a16="http://schemas.microsoft.com/office/drawing/2014/main" id="{B88242B7-1BF3-4226-978B-1C1152DB6837}"/>
-              </a:ext>
-            </a:extLst>
-          </p:cNvPr>
-          <p:cNvPicPr>
-            <a:picLocks noChangeAspect="1" noChangeArrowheads="1"/>
-          </p:cNvPicPr>
-          <p:nvPr/>
-        </p:nvPicPr>
-        <p:blipFill>
-          <a:blip r:embed="rId2">
-            <a:extLst>
-              <a:ext uri="{28A0092B-C50C-407E-A947-70E740481C1C}">
-                <a14:useLocalDpi xmlns:a14="http://schemas.microsoft.com/office/drawing/2010/main" val="0"/>
-              </a:ext>
-            </a:extLst>
-          </a:blip>
-          <a:srcRect/>
-          <a:stretch>
-            <a:fillRect/>
-          </a:stretch>
-        </p:blipFill>
-        <p:spPr bwMode="auto">
-          <a:xfrm>
-            <a:off x="9878565" y="4746509"/>
-            <a:ext cx="1949450" cy="1898472"/>
-          </a:xfrm>
-          <a:prstGeom prst="rect">
-            <a:avLst/>
-          </a:prstGeom>
-          <a:noFill/>
-          <a:extLst>
-            <a:ext uri="{909E8E84-426E-40DD-AFC4-6F175D3DCCD1}">
-              <a14:hiddenFill xmlns:a14="http://schemas.microsoft.com/office/drawing/2010/main">
-                <a:solidFill>
-                  <a:srgbClr val="FFFFFF"/>
-                </a:solidFill>
-              </a14:hiddenFill>
-            </a:ext>
-          </a:extLst>
-        </p:spPr>
-      </p:pic>
-    </p:spTree>
-    <p:extLst>
-      <p:ext uri="{BB962C8B-B14F-4D97-AF65-F5344CB8AC3E}">
-        <p14:creationId xmlns:p14="http://schemas.microsoft.com/office/powerpoint/2010/main" val="2511828912"/>
       </p:ext>
     </p:extLst>
   </p:cSld>

</xml_diff>